<commit_message>
Updated presentation. Added PDF.
</commit_message>
<xml_diff>
--- a/COOP.pptx
+++ b/COOP.pptx
@@ -260,7 +260,7 @@
           <a:p>
             <a:fld id="{9E2966B5-D90F-4948-8BCC-BB9CA59B2E06}" type="datetimeFigureOut">
               <a:rPr lang="en-US" smtClean="0"/>
-              <a:t>10/16/2017</a:t>
+              <a:t>11/13/2017</a:t>
             </a:fld>
             <a:endParaRPr lang="en-US"/>
           </a:p>
@@ -1681,7 +1681,7 @@
           <a:p>
             <a:fld id="{D39C8547-764F-417E-AA1B-D2C8B5082AF7}" type="datetimeFigureOut">
               <a:rPr lang="en-US" smtClean="0"/>
-              <a:t>10/16/2017</a:t>
+              <a:t>11/13/2017</a:t>
             </a:fld>
             <a:endParaRPr lang="en-US"/>
           </a:p>
@@ -1889,7 +1889,7 @@
           <a:p>
             <a:fld id="{D39C8547-764F-417E-AA1B-D2C8B5082AF7}" type="datetimeFigureOut">
               <a:rPr lang="en-US" smtClean="0"/>
-              <a:t>10/16/2017</a:t>
+              <a:t>11/13/2017</a:t>
             </a:fld>
             <a:endParaRPr lang="en-US"/>
           </a:p>
@@ -2145,7 +2145,7 @@
           <a:p>
             <a:fld id="{D39C8547-764F-417E-AA1B-D2C8B5082AF7}" type="datetimeFigureOut">
               <a:rPr lang="en-US" smtClean="0"/>
-              <a:t>10/16/2017</a:t>
+              <a:t>11/13/2017</a:t>
             </a:fld>
             <a:endParaRPr lang="en-US"/>
           </a:p>
@@ -2319,7 +2319,7 @@
           <a:p>
             <a:fld id="{D39C8547-764F-417E-AA1B-D2C8B5082AF7}" type="datetimeFigureOut">
               <a:rPr lang="en-US" smtClean="0"/>
-              <a:t>10/16/2017</a:t>
+              <a:t>11/13/2017</a:t>
             </a:fld>
             <a:endParaRPr lang="en-US"/>
           </a:p>
@@ -2662,7 +2662,7 @@
           <a:p>
             <a:fld id="{D39C8547-764F-417E-AA1B-D2C8B5082AF7}" type="datetimeFigureOut">
               <a:rPr lang="en-US" smtClean="0"/>
-              <a:t>10/16/2017</a:t>
+              <a:t>11/13/2017</a:t>
             </a:fld>
             <a:endParaRPr lang="en-US"/>
           </a:p>
@@ -2937,7 +2937,7 @@
           <a:p>
             <a:fld id="{D39C8547-764F-417E-AA1B-D2C8B5082AF7}" type="datetimeFigureOut">
               <a:rPr lang="en-US" smtClean="0"/>
-              <a:t>10/16/2017</a:t>
+              <a:t>11/13/2017</a:t>
             </a:fld>
             <a:endParaRPr lang="en-US"/>
           </a:p>
@@ -3316,7 +3316,7 @@
           <a:p>
             <a:fld id="{D39C8547-764F-417E-AA1B-D2C8B5082AF7}" type="datetimeFigureOut">
               <a:rPr lang="en-US" smtClean="0"/>
-              <a:t>10/16/2017</a:t>
+              <a:t>11/13/2017</a:t>
             </a:fld>
             <a:endParaRPr lang="en-US"/>
           </a:p>
@@ -3434,7 +3434,7 @@
           <a:p>
             <a:fld id="{D39C8547-764F-417E-AA1B-D2C8B5082AF7}" type="datetimeFigureOut">
               <a:rPr lang="en-US" smtClean="0"/>
-              <a:t>10/16/2017</a:t>
+              <a:t>11/13/2017</a:t>
             </a:fld>
             <a:endParaRPr lang="en-US"/>
           </a:p>
@@ -3605,7 +3605,7 @@
           <a:p>
             <a:fld id="{D39C8547-764F-417E-AA1B-D2C8B5082AF7}" type="datetimeFigureOut">
               <a:rPr lang="en-US" smtClean="0"/>
-              <a:t>10/16/2017</a:t>
+              <a:t>11/13/2017</a:t>
             </a:fld>
             <a:endParaRPr lang="en-US"/>
           </a:p>
@@ -3959,7 +3959,7 @@
           <a:p>
             <a:fld id="{D39C8547-764F-417E-AA1B-D2C8B5082AF7}" type="datetimeFigureOut">
               <a:rPr lang="en-US" smtClean="0"/>
-              <a:t>10/16/2017</a:t>
+              <a:t>11/13/2017</a:t>
             </a:fld>
             <a:endParaRPr lang="en-US"/>
           </a:p>
@@ -4341,7 +4341,7 @@
           <a:p>
             <a:fld id="{D39C8547-764F-417E-AA1B-D2C8B5082AF7}" type="datetimeFigureOut">
               <a:rPr lang="en-US" smtClean="0"/>
-              <a:t>10/16/2017</a:t>
+              <a:t>11/13/2017</a:t>
             </a:fld>
             <a:endParaRPr lang="en-US"/>
           </a:p>
@@ -4628,7 +4628,7 @@
           <a:p>
             <a:fld id="{D39C8547-764F-417E-AA1B-D2C8B5082AF7}" type="datetimeFigureOut">
               <a:rPr lang="en-US" smtClean="0"/>
-              <a:t>10/16/2017</a:t>
+              <a:t>11/13/2017</a:t>
             </a:fld>
             <a:endParaRPr lang="en-US"/>
           </a:p>
@@ -5315,7 +5315,7 @@
           <a:p>
             <a:r>
               <a:rPr lang="en-US" sz="2800" dirty="0"/>
-              <a:t>Provide existing techniques with three contributions</a:t>
+              <a:t>Three contributions</a:t>
             </a:r>
           </a:p>
           <a:p>
@@ -5336,7 +5336,7 @@
             <a:pPr lvl="1"/>
             <a:r>
               <a:rPr lang="en-US" sz="2800" dirty="0"/>
-              <a:t>Modify virtual tables from read-access to execute-access, preventing layout disclosure</a:t>
+              <a:t>Modify virtual tables from read-access to execute-access - preventing layout disclosure</a:t>
             </a:r>
           </a:p>
         </p:txBody>
@@ -5417,7 +5417,7 @@
           <a:p>
             <a:r>
               <a:rPr lang="en-US" sz="2800" dirty="0"/>
-              <a:t>Unlike Java, C++ supports multiple inheritance</a:t>
+              <a:t>C++ supports multiple inheritance</a:t>
             </a:r>
           </a:p>
           <a:p>
@@ -5531,7 +5531,15 @@
           <a:p>
             <a:r>
               <a:rPr lang="en-US" sz="2800" dirty="0"/>
-              <a:t>Virtual method calls contain a pointer to a table</a:t>
+              <a:t>Virtual method calls rely on a pointer to a </a:t>
+            </a:r>
+            <a:r>
+              <a:rPr lang="en-US" sz="2800" dirty="0" err="1"/>
+              <a:t>Vtable</a:t>
+            </a:r>
+            <a:r>
+              <a:rPr lang="en-US" sz="2800" dirty="0"/>
+              <a:t> (virtual table)</a:t>
             </a:r>
           </a:p>
           <a:p>
@@ -5545,13 +5553,13 @@
             </a:r>
             <a:r>
               <a:rPr lang="en-US" sz="2800" dirty="0"/>
-              <a:t> (virtual table) contains overridden versions of a method</a:t>
-            </a:r>
-          </a:p>
-          <a:p>
-            <a:r>
-              <a:rPr lang="en-US" sz="2800" dirty="0"/>
-              <a:t>Correct entry is selected at runtime, when the function is called</a:t>
+              <a:t> contains overridden versions of a method</a:t>
+            </a:r>
+          </a:p>
+          <a:p>
+            <a:r>
+              <a:rPr lang="en-US" sz="2800" dirty="0"/>
+              <a:t>Correct entry selected when the function is called</a:t>
             </a:r>
           </a:p>
         </p:txBody>
@@ -5740,12 +5748,8 @@
           </a:p>
           <a:p>
             <a:r>
-              <a:rPr lang="en-US" sz="2800"/>
-              <a:t>Varied </a:t>
-            </a:r>
-            <a:r>
-              <a:rPr lang="en-US" sz="2800" dirty="0"/>
-              <a:t>program behavior given a single function call</a:t>
+              <a:rPr lang="en-US" sz="2800" dirty="0"/>
+              <a:t>Varied program behavior from a single function call</a:t>
             </a:r>
           </a:p>
           <a:p>
@@ -5843,7 +5847,7 @@
           <a:p>
             <a:r>
               <a:rPr lang="en-US" sz="2800" dirty="0"/>
-              <a:t>However, The pointer to the table itself, is stored in writable memory</a:t>
+              <a:t>However, The pointer to the table itself is stored in writable memory</a:t>
             </a:r>
           </a:p>
           <a:p>
@@ -5874,22 +5878,22 @@
           <a:p>
             <a:pPr lvl="1"/>
             <a:r>
-              <a:rPr lang="en-US" sz="2600" dirty="0"/>
+              <a:rPr lang="en-US" sz="2800" dirty="0"/>
               <a:t>Craft their own virtual table</a:t>
             </a:r>
           </a:p>
           <a:p>
             <a:pPr lvl="1"/>
             <a:r>
-              <a:rPr lang="en-US" sz="2600" dirty="0"/>
+              <a:rPr lang="en-US" sz="2800" dirty="0"/>
               <a:t>Overwrite existing </a:t>
             </a:r>
             <a:r>
-              <a:rPr lang="en-US" sz="2600" dirty="0" err="1"/>
+              <a:rPr lang="en-US" sz="2800" dirty="0" err="1"/>
               <a:t>VTable</a:t>
             </a:r>
             <a:r>
-              <a:rPr lang="en-US" sz="2600" dirty="0"/>
+              <a:rPr lang="en-US" sz="2800" dirty="0"/>
               <a:t> pointer to point to their virtual table</a:t>
             </a:r>
           </a:p>
@@ -6072,7 +6076,7 @@
         <p:spPr/>
         <p:txBody>
           <a:bodyPr>
-            <a:normAutofit fontScale="92500" lnSpcReduction="20000"/>
+            <a:normAutofit/>
           </a:bodyPr>
           <a:lstStyle/>
           <a:p>
@@ -6084,7 +6088,7 @@
           <a:p>
             <a:r>
               <a:rPr lang="en-US" sz="2800" dirty="0"/>
-              <a:t>Analogue to gadgets from ROP</a:t>
+              <a:t>Analogous to gadgets from ROP</a:t>
             </a:r>
           </a:p>
           <a:p>
@@ -6108,13 +6112,7 @@
           <a:p>
             <a:r>
               <a:rPr lang="en-US" sz="2800" dirty="0"/>
-              <a:t>One might think that the COOP threat may be nullified by removing potential ML-Gs</a:t>
-            </a:r>
-          </a:p>
-          <a:p>
-            <a:r>
-              <a:rPr lang="en-US" sz="2800" dirty="0"/>
-              <a:t>To disprove this, the authors devised two ML-Gs of their own</a:t>
+              <a:t>COOP cannot be nullified by removing potential ML-Gs</a:t>
             </a:r>
           </a:p>
           <a:p>
@@ -6211,7 +6209,7 @@
           <a:p>
             <a:r>
               <a:rPr lang="en-US" sz="2800" dirty="0"/>
-              <a:t>Destructors which call further destructors are the most popular target</a:t>
+              <a:t>Destructors which call further destructors are a popular target</a:t>
             </a:r>
           </a:p>
         </p:txBody>
@@ -6771,18 +6769,14 @@
           </a:p>
           <a:p>
             <a:r>
-              <a:rPr lang="en-US" sz="2800" dirty="0" err="1"/>
-              <a:t>Readactor</a:t>
-            </a:r>
-            <a:r>
-              <a:rPr lang="en-US" sz="2800" dirty="0"/>
-              <a:t> is a security framework aimed at combatting ROP attacks</a:t>
-            </a:r>
-          </a:p>
-          <a:p>
-            <a:r>
-              <a:rPr lang="en-US" sz="2800" dirty="0"/>
-              <a:t>Aimed to extend </a:t>
+              <a:rPr lang="en-US" sz="2800" dirty="0"/>
+              <a:t>A security framework aimed at combatting ROP attacks</a:t>
+            </a:r>
+          </a:p>
+          <a:p>
+            <a:r>
+              <a:rPr lang="en-US" sz="2800" dirty="0"/>
+              <a:t>Extended </a:t>
             </a:r>
             <a:r>
               <a:rPr lang="en-US" sz="2800" dirty="0" err="1"/>
@@ -7088,7 +7082,7 @@
             <a:pPr lvl="1"/>
             <a:r>
               <a:rPr lang="en-US" sz="2800" dirty="0"/>
-              <a:t>Read the code segment of the program stack</a:t>
+              <a:t>Read code segment of the program stack</a:t>
             </a:r>
           </a:p>
           <a:p>
@@ -7113,7 +7107,7 @@
             </a:r>
             <a:r>
               <a:rPr lang="en-US" sz="2800" dirty="0"/>
-              <a:t>++ combats this by hiding all code pointers and replacing them with “trampolines”</a:t>
+              <a:t>++ hides all code pointers and replaces them with “trampolines”</a:t>
             </a:r>
           </a:p>
         </p:txBody>
@@ -7197,13 +7191,19 @@
           <a:p>
             <a:r>
               <a:rPr lang="en-US" sz="2800" dirty="0"/>
-              <a:t>Trampolines provide extra layer of indirection, hides the code segment</a:t>
-            </a:r>
-          </a:p>
-          <a:p>
-            <a:r>
-              <a:rPr lang="en-US" sz="2800" dirty="0"/>
-              <a:t>Trampolines may not be dereferenced (unlike pointers), attackers cannot force them to disclose memory layout</a:t>
+              <a:t>Trampolines provide extra layer of indirection</a:t>
+            </a:r>
+          </a:p>
+          <a:p>
+            <a:r>
+              <a:rPr lang="en-US" sz="2800" dirty="0"/>
+              <a:t>Hides the code segment</a:t>
+            </a:r>
+          </a:p>
+          <a:p>
+            <a:r>
+              <a:rPr lang="en-US" sz="2800" dirty="0"/>
+              <a:t>Trampolines cannot be dereferenced (unlike pointers), attackers cannot force them to disclose memory layout</a:t>
             </a:r>
           </a:p>
           <a:p>
@@ -7395,7 +7395,7 @@
             <a:pPr lvl="1"/>
             <a:r>
               <a:rPr lang="en-US" sz="2800" dirty="0"/>
-              <a:t>Known as the “</a:t>
+              <a:t>“</a:t>
             </a:r>
             <a:r>
               <a:rPr lang="en-US" sz="2800" dirty="0" err="1"/>
@@ -7409,7 +7409,7 @@
           <a:p>
             <a:r>
               <a:rPr lang="en-US" sz="2800" dirty="0"/>
-              <a:t>Randomizing object’s metadata layout is not enough</a:t>
+              <a:t>Randomizing object’s metadata layout is insufficient</a:t>
             </a:r>
           </a:p>
           <a:p>
@@ -7496,7 +7496,7 @@
           <a:p>
             <a:r>
               <a:rPr lang="en-US" sz="2800" dirty="0"/>
-              <a:t>Once tables are randomized, need to prevent code pointers from being read</a:t>
+              <a:t>Once layout is randomized, need to prevent code pointers from being read</a:t>
             </a:r>
           </a:p>
           <a:p>
@@ -7590,7 +7590,7 @@
           <a:p>
             <a:r>
               <a:rPr lang="en-US" sz="2800" dirty="0"/>
-              <a:t>Malicious code is introduced into the system from an outside source</a:t>
+              <a:t>Malicious code introduced into system from outside source</a:t>
             </a:r>
           </a:p>
           <a:p>
@@ -7602,7 +7602,7 @@
           <a:p>
             <a:r>
               <a:rPr lang="en-US" sz="2800" dirty="0"/>
-              <a:t>Hijacked program counter will return into the injected code</a:t>
+              <a:t>Hijacked program counter returns into injected code</a:t>
             </a:r>
           </a:p>
         </p:txBody>
@@ -7787,13 +7787,13 @@
           <a:p>
             <a:r>
               <a:rPr lang="en-US" sz="2800" dirty="0"/>
-              <a:t>Brute force attacks can exploit virtual tables</a:t>
-            </a:r>
-          </a:p>
-          <a:p>
-            <a:r>
-              <a:rPr lang="en-US" sz="2800" dirty="0"/>
-              <a:t>Attacker probes the randomized </a:t>
+              <a:t>Brute force attacks exploit virtual tables</a:t>
+            </a:r>
+          </a:p>
+          <a:p>
+            <a:r>
+              <a:rPr lang="en-US" sz="2800" dirty="0"/>
+              <a:t>Attacker probes randomized </a:t>
             </a:r>
             <a:r>
               <a:rPr lang="en-US" sz="2800" dirty="0" err="1"/>
@@ -7801,13 +7801,13 @@
             </a:r>
             <a:r>
               <a:rPr lang="en-US" sz="2800" dirty="0"/>
-              <a:t> until familiar with the layout</a:t>
-            </a:r>
-          </a:p>
-          <a:p>
-            <a:r>
-              <a:rPr lang="en-US" sz="2800" dirty="0"/>
-              <a:t>Booby-traps in the execute-only </a:t>
+              <a:t> until familiar with layout</a:t>
+            </a:r>
+          </a:p>
+          <a:p>
+            <a:r>
+              <a:rPr lang="en-US" sz="2800" dirty="0"/>
+              <a:t>Booby-traps in execute-only </a:t>
             </a:r>
             <a:r>
               <a:rPr lang="en-US" sz="2800" dirty="0" err="1"/>
@@ -7815,7 +7815,7 @@
             </a:r>
             <a:r>
               <a:rPr lang="en-US" sz="2800" dirty="0"/>
-              <a:t> will discourage probing</a:t>
+              <a:t> discourage probing</a:t>
             </a:r>
           </a:p>
           <a:p>
@@ -7834,15 +7834,19 @@
           <a:p>
             <a:pPr lvl="1"/>
             <a:r>
-              <a:rPr lang="en-US" sz="2800" dirty="0"/>
-              <a:t>Virtual Table layout will freshly randomize</a:t>
+              <a:rPr lang="en-US" sz="2800" dirty="0" err="1"/>
+              <a:t>VTable</a:t>
+            </a:r>
+            <a:r>
+              <a:rPr lang="en-US" sz="2800" dirty="0"/>
+              <a:t> layout will freshly randomize</a:t>
             </a:r>
           </a:p>
           <a:p>
             <a:pPr lvl="1"/>
             <a:r>
               <a:rPr lang="en-US" sz="2800" dirty="0"/>
-              <a:t>Application reports the activity to a system administrator</a:t>
+              <a:t>Application reports activity to system administrator</a:t>
             </a:r>
           </a:p>
           <a:p>
@@ -8030,13 +8034,13 @@
           <a:p>
             <a:r>
               <a:rPr lang="en-US" sz="2800" dirty="0"/>
-              <a:t>Exploiting this structure is vital to a RILC attack’s success</a:t>
-            </a:r>
-          </a:p>
-          <a:p>
-            <a:r>
-              <a:rPr lang="en-US" sz="2800" dirty="0"/>
-              <a:t>Entries organized in series, with the base addresses randomized</a:t>
+              <a:t>Exploiting this structure is vital to RILC attack’s success</a:t>
+            </a:r>
+          </a:p>
+          <a:p>
+            <a:r>
+              <a:rPr lang="en-US" sz="2800" dirty="0"/>
+              <a:t>Entries organized in series, with base addresses randomized</a:t>
             </a:r>
           </a:p>
           <a:p>
@@ -8481,7 +8485,7 @@
             <a:pPr lvl="1"/>
             <a:r>
               <a:rPr lang="en-US" sz="2600" dirty="0"/>
-              <a:t>Possible security extension, could cause problems</a:t>
+              <a:t>Possible security extension</a:t>
             </a:r>
           </a:p>
           <a:p>
@@ -8494,7 +8498,7 @@
             <a:pPr lvl="1"/>
             <a:r>
               <a:rPr lang="en-US" sz="2800" dirty="0"/>
-              <a:t>Probe the stack until the layout is known</a:t>
+              <a:t>Probe stack until layout is known</a:t>
             </a:r>
           </a:p>
           <a:p>
@@ -8634,7 +8638,7 @@
           <a:p>
             <a:r>
               <a:rPr lang="en-US" sz="2400" dirty="0"/>
-              <a:t>Can only measure performance of C++ components in the Chromium system</a:t>
+              <a:t>Can only measure performance of C++ components in Chromium system</a:t>
             </a:r>
           </a:p>
           <a:p>
@@ -8838,7 +8842,7 @@
           <a:p>
             <a:r>
               <a:rPr lang="en-US" sz="2800" dirty="0"/>
-              <a:t>Once again, a buffer is overflowed to hijack the program counter</a:t>
+              <a:t>Once again, a buffer is overflowed to hijack program counter</a:t>
             </a:r>
           </a:p>
           <a:p>
@@ -8852,7 +8856,7 @@
             </a:r>
             <a:r>
               <a:rPr lang="en-US" sz="2800" dirty="0"/>
-              <a:t> is a famous Code Reuse Attack</a:t>
+              <a:t> - famous Code Reuse Attack</a:t>
             </a:r>
           </a:p>
           <a:p>
@@ -8864,13 +8868,6 @@
             <a:r>
               <a:rPr lang="en-US" sz="2800" dirty="0"/>
               <a:t> contains many system utility functions</a:t>
-            </a:r>
-          </a:p>
-          <a:p>
-            <a:pPr lvl="1"/>
-            <a:r>
-              <a:rPr lang="en-US" sz="2800" dirty="0"/>
-              <a:t>A veritable playground for attackers</a:t>
             </a:r>
           </a:p>
           <a:p>
@@ -8985,14 +8982,14 @@
             <a:pPr lvl="1"/>
             <a:r>
               <a:rPr lang="en-US" sz="2800" dirty="0"/>
-              <a:t>These could be a potential attack vector for clever hackers</a:t>
+              <a:t>Potential attack vector for clever hackers</a:t>
             </a:r>
           </a:p>
           <a:p>
             <a:pPr lvl="1"/>
             <a:r>
               <a:rPr lang="en-US" sz="2800" dirty="0"/>
-              <a:t>Libraries loaded at runtime are vulnerable to COOP attack</a:t>
+              <a:t>Libraries loaded at runtime vulnerable to COOP attack</a:t>
             </a:r>
           </a:p>
         </p:txBody>
@@ -9072,7 +9069,7 @@
             </a:r>
             <a:r>
               <a:rPr lang="en-US" sz="2800" dirty="0"/>
-              <a:t>++ covers only those programs which adhere to the C++ language specification</a:t>
+              <a:t>++ covers programs which adhere to the C++ language specification</a:t>
             </a:r>
           </a:p>
           <a:p>
@@ -9096,7 +9093,7 @@
             </a:r>
             <a:r>
               <a:rPr lang="en-US" sz="2800" dirty="0"/>
-              <a:t> have different implementations between platforms and compilers</a:t>
+              <a:t> have different implementations between architectures</a:t>
             </a:r>
           </a:p>
         </p:txBody>
@@ -9265,49 +9262,40 @@
           <a:lstStyle/>
           <a:p>
             <a:r>
-              <a:rPr lang="en-US" sz="2800" dirty="0"/>
-              <a:t>There have been many studies concerning memory corruption and its defense</a:t>
+              <a:rPr lang="en-US" sz="3000" dirty="0"/>
+              <a:t>Code Layout Randomization</a:t>
             </a:r>
           </a:p>
           <a:p>
             <a:pPr lvl="1"/>
             <a:r>
-              <a:rPr lang="en-US" sz="2800" dirty="0"/>
-              <a:t>Code Layout Randomization</a:t>
-            </a:r>
-          </a:p>
-          <a:p>
-            <a:pPr lvl="2"/>
-            <a:r>
-              <a:rPr lang="en-US" sz="2800" dirty="0"/>
+              <a:rPr lang="en-US" sz="3200" dirty="0"/>
               <a:t>Defense schemes for obfuscating and combatting memory layout disclosure</a:t>
             </a:r>
           </a:p>
           <a:p>
+            <a:r>
+              <a:rPr lang="en-US" sz="3000" dirty="0"/>
+              <a:t>Control-Flow Integrity</a:t>
+            </a:r>
+          </a:p>
+          <a:p>
             <a:pPr lvl="1"/>
             <a:r>
-              <a:rPr lang="en-US" sz="2800" dirty="0"/>
-              <a:t>Control-Flow Integrity</a:t>
-            </a:r>
-          </a:p>
-          <a:p>
-            <a:pPr lvl="2"/>
-            <a:r>
-              <a:rPr lang="en-US" sz="2800" dirty="0"/>
+              <a:rPr lang="en-US" sz="3200" dirty="0"/>
               <a:t>Defend against illegal program states</a:t>
             </a:r>
           </a:p>
           <a:p>
+            <a:r>
+              <a:rPr lang="en-US" sz="3000" dirty="0"/>
+              <a:t>Code Pointer Integrity</a:t>
+            </a:r>
+          </a:p>
+          <a:p>
             <a:pPr lvl="1"/>
             <a:r>
-              <a:rPr lang="en-US" sz="2800" dirty="0"/>
-              <a:t>Code Pointer Integrity</a:t>
-            </a:r>
-          </a:p>
-          <a:p>
-            <a:pPr lvl="2"/>
-            <a:r>
-              <a:rPr lang="en-US" sz="2800" dirty="0"/>
+              <a:rPr lang="en-US" sz="3200" dirty="0"/>
               <a:t>Defend against code pointer exploitation</a:t>
             </a:r>
           </a:p>
@@ -9548,7 +9536,7 @@
             <a:pPr lvl="1"/>
             <a:r>
               <a:rPr lang="en-US" sz="2800" dirty="0"/>
-              <a:t>Method is vulnerable to RILC attacks as return instructions are not protected</a:t>
+              <a:t>Method is vulnerable to RILC attacks - return instructions not protected</a:t>
             </a:r>
           </a:p>
         </p:txBody>
@@ -9653,7 +9641,7 @@
             <a:pPr lvl="1"/>
             <a:r>
               <a:rPr lang="en-US" sz="2800" dirty="0"/>
-              <a:t>Only functions deemed “trustworthy” may be given access to these pointers</a:t>
+              <a:t>Only functions deemed “trustworthy” given access to these pointers</a:t>
             </a:r>
           </a:p>
           <a:p>
@@ -9748,7 +9736,7 @@
           <a:p>
             <a:r>
               <a:rPr lang="en-US" sz="2800" dirty="0"/>
-              <a:t>Code Reuse attacks, namely ROP and COOP attacks have become increasingly troublesome</a:t>
+              <a:t>Code Reuse attacks (ROP, COOP) are problematic</a:t>
             </a:r>
           </a:p>
           <a:p>
@@ -9758,7 +9746,7 @@
             </a:r>
             <a:r>
               <a:rPr lang="en-US" sz="2800" dirty="0"/>
-              <a:t>++ is an interesting and novel defense against COOP attacks</a:t>
+              <a:t>++ is a novel defense against COOP attacks</a:t>
             </a:r>
           </a:p>
           <a:p>
@@ -9788,7 +9776,7 @@
           <a:p>
             <a:r>
               <a:rPr lang="en-US" sz="2800" dirty="0"/>
-              <a:t>When using clever configuration options, </a:t>
+              <a:t>Using clever configuration options, </a:t>
             </a:r>
             <a:r>
               <a:rPr lang="en-US" sz="2800" dirty="0" err="1"/>
@@ -9796,7 +9784,15 @@
             </a:r>
             <a:r>
               <a:rPr lang="en-US" sz="2800" dirty="0"/>
-              <a:t>++ has been shown to have negligible affect on system performance</a:t>
+              <a:t>++ </a:t>
+            </a:r>
+            <a:r>
+              <a:rPr lang="en-US" sz="2800"/>
+              <a:t>has negligible </a:t>
+            </a:r>
+            <a:r>
+              <a:rPr lang="en-US" sz="2800" dirty="0"/>
+              <a:t>affect on system performance</a:t>
             </a:r>
           </a:p>
         </p:txBody>
@@ -9979,7 +9975,7 @@
           <a:p>
             <a:r>
               <a:rPr lang="en-US" sz="2800" dirty="0"/>
-              <a:t>Gadgets are chained together to execute a sequence of subroutines</a:t>
+              <a:t>Gadgets chained together to execute a sequence of subroutines</a:t>
             </a:r>
           </a:p>
           <a:p>
@@ -10168,14 +10164,14 @@
           <a:p>
             <a:r>
               <a:rPr lang="en-US" sz="2800" dirty="0"/>
-              <a:t>External library calls are stored and looked up in a table at runtime (dynamically-bound functions)</a:t>
+              <a:t>External library calls are stored and looked up at runtime</a:t>
             </a:r>
           </a:p>
           <a:p>
             <a:pPr lvl="1"/>
             <a:r>
               <a:rPr lang="en-US" sz="2800" dirty="0"/>
-              <a:t>Allows for method selection at runtime</a:t>
+              <a:t>Enables method selection at runtime</a:t>
             </a:r>
           </a:p>
           <a:p>
@@ -10270,7 +10266,7 @@
           <a:p>
             <a:r>
               <a:rPr lang="en-US" sz="2800" dirty="0"/>
-              <a:t>Data Execution Prevention (DEP) has resulted in Code Injection disuse</a:t>
+              <a:t>Data Execution Prevention (DEP) resulted in Code Injection disuse</a:t>
             </a:r>
           </a:p>
           <a:p>
@@ -10297,26 +10293,26 @@
             <a:pPr lvl="1"/>
             <a:r>
               <a:rPr lang="en-US" sz="2800" dirty="0"/>
-              <a:t>Prevents data from being interpreted as machine instructions</a:t>
+              <a:t>Prevents data being interpreted as machine instructions</a:t>
             </a:r>
           </a:p>
           <a:p>
             <a:pPr lvl="1"/>
             <a:r>
               <a:rPr lang="en-US" sz="2800" dirty="0"/>
-              <a:t>Very problematic for code injection</a:t>
-            </a:r>
-          </a:p>
-          <a:p>
-            <a:r>
-              <a:rPr lang="en-US" sz="2800" dirty="0"/>
-              <a:t>Address randomization has further complicated Code Injection</a:t>
-            </a:r>
-          </a:p>
-          <a:p>
-            <a:r>
-              <a:rPr lang="en-US" sz="2800" dirty="0"/>
-              <a:t>These advancements led to the increased popularity of Code Reuse Attacks</a:t>
+              <a:t>Defeats Code Injection</a:t>
+            </a:r>
+          </a:p>
+          <a:p>
+            <a:r>
+              <a:rPr lang="en-US" sz="2800" dirty="0"/>
+              <a:t>Address randomization further complicates Code Injection</a:t>
+            </a:r>
+          </a:p>
+          <a:p>
+            <a:r>
+              <a:rPr lang="en-US" sz="2800" dirty="0"/>
+              <a:t>Increased the popularity of Code Reuse Attacks</a:t>
             </a:r>
           </a:p>
           <a:p>
@@ -10407,13 +10403,20 @@
             <a:pPr lvl="1"/>
             <a:r>
               <a:rPr lang="en-US" sz="2800" dirty="0"/>
-              <a:t>Can’t assume address layout, base address is random between executions</a:t>
+              <a:t>Can’t assume address layout</a:t>
             </a:r>
           </a:p>
           <a:p>
             <a:pPr lvl="1"/>
             <a:r>
               <a:rPr lang="en-US" sz="2800" dirty="0"/>
+              <a:t>Base address random between executions</a:t>
+            </a:r>
+          </a:p>
+          <a:p>
+            <a:pPr lvl="1"/>
+            <a:r>
+              <a:rPr lang="en-US" sz="2800" dirty="0"/>
               <a:t>Not a silver bullet</a:t>
             </a:r>
           </a:p>
@@ -10421,7 +10424,7 @@
             <a:pPr lvl="2"/>
             <a:r>
               <a:rPr lang="en-US" sz="2800" dirty="0"/>
-              <a:t>Just-In-Time Compilation learns address layout on the fly</a:t>
+              <a:t>Just-In-Time Compilation learns address layout dynamically</a:t>
             </a:r>
           </a:p>
           <a:p>
@@ -10438,7 +10441,7 @@
             <a:pPr lvl="1"/>
             <a:r>
               <a:rPr lang="en-US" sz="2800" dirty="0"/>
-              <a:t>Aimed at defending against JIT-ROP attacks</a:t>
+              <a:t>Defends against JIT-ROP attacks</a:t>
             </a:r>
           </a:p>
           <a:p>

</xml_diff>